<commit_message>
new template, new dates, times and logo
Added the final presentations template
</commit_message>
<xml_diff>
--- a/Template for final presentations.pptx
+++ b/Template for final presentations.pptx
@@ -4437,7 +4437,7 @@
         <p:spPr/>
         <p:txBody>
           <a:bodyPr>
-            <a:normAutofit lnSpcReduction="10000"/>
+            <a:normAutofit fontScale="92500" lnSpcReduction="10000"/>
           </a:bodyPr>
           <a:lstStyle/>
           <a:p>
@@ -4467,8 +4467,25 @@
           <a:p>
             <a:r>
               <a:rPr lang="en-US" sz="3600" dirty="0"/>
-              <a:t>Performance metrics (see detailed description ppt)</a:t>
-            </a:r>
+              <a:t>Performance metrics (see </a:t>
+            </a:r>
+            <a:r>
+              <a:rPr lang="en-US" sz="3600" dirty="0">
+                <a:hlinkClick r:id="rId2"/>
+              </a:rPr>
+              <a:t>detailed </a:t>
+            </a:r>
+            <a:r>
+              <a:rPr lang="en-US" sz="3600">
+                <a:hlinkClick r:id="rId2"/>
+              </a:rPr>
+              <a:t>description ppt</a:t>
+            </a:r>
+            <a:r>
+              <a:rPr lang="en-US" sz="3600"/>
+              <a:t> pages 10-11)</a:t>
+            </a:r>
+            <a:endParaRPr lang="en-US" sz="3600" dirty="0"/>
           </a:p>
         </p:txBody>
       </p:sp>

</xml_diff>